<commit_message>
with spec of POD
POD
</commit_message>
<xml_diff>
--- a/Slides/MSFT_Requirement.pptx
+++ b/Slides/MSFT_Requirement.pptx
@@ -7272,10 +7272,6 @@
               <a:rPr lang="en-US" sz="1800" dirty="0" smtClean="0"/>
               <a:t>Xin Fang</a:t>
             </a:r>
-            <a:r>
-              <a:rPr lang="en-US" sz="1800" dirty="0" smtClean="0"/>
-              <a:t/>
-            </a:r>
             <a:br>
               <a:rPr lang="en-US" sz="1800" dirty="0" smtClean="0"/>
             </a:br>
@@ -7283,7 +7279,6 @@
               <a:rPr lang="en-US" sz="1800" dirty="0" smtClean="0"/>
               <a:t>Jan. 2017</a:t>
             </a:r>
-            <a:endParaRPr lang="en-US" sz="1800" dirty="0" smtClean="0"/>
           </a:p>
         </p:txBody>
       </p:sp>
@@ -8145,19 +8140,7 @@
           <a:p>
             <a:r>
               <a:rPr lang="en-US" dirty="0" smtClean="0"/>
-              <a:t>Value Contract </a:t>
-            </a:r>
-            <a:r>
-              <a:rPr lang="en-US" dirty="0" smtClean="0"/>
-              <a:t>( Consumption-based </a:t>
-            </a:r>
-            <a:r>
-              <a:rPr lang="en-US" dirty="0" smtClean="0"/>
-              <a:t>Rev </a:t>
-            </a:r>
-            <a:r>
-              <a:rPr lang="en-US" dirty="0" smtClean="0"/>
-              <a:t>Rec )</a:t>
+              <a:t>Value Contract ( Consumption-based Rev Rec )</a:t>
             </a:r>
             <a:endParaRPr lang="en-US" dirty="0"/>
           </a:p>
@@ -11753,13 +11736,13 @@
               <a:tabLst/>
             </a:pPr>
             <a:r>
-              <a:rPr lang="en-US" sz="1000" kern="0" noProof="0" dirty="0" smtClean="0">
+              <a:rPr lang="en-US" sz="1000" b="1" kern="0" noProof="0" dirty="0" smtClean="0">
                 <a:ea typeface="Arial Unicode MS" pitchFamily="34" charset="-128"/>
                 <a:cs typeface="Arial Unicode MS" pitchFamily="34" charset="-128"/>
               </a:rPr>
               <a:t>FARR_D_FUFILLMENT</a:t>
             </a:r>
-            <a:endParaRPr kumimoji="0" lang="en-US" sz="1000" b="0" i="0" u="none" strike="noStrike" kern="0" cap="none" spc="0" normalizeH="0" baseline="0" noProof="0" dirty="0" smtClean="0">
+            <a:endParaRPr kumimoji="0" lang="en-US" sz="1000" b="1" i="0" u="none" strike="noStrike" kern="0" cap="none" spc="0" normalizeH="0" baseline="0" noProof="0" dirty="0" smtClean="0">
               <a:ln>
                 <a:noFill/>
               </a:ln>
@@ -12503,7 +12486,7 @@
                 <a:ea typeface="Arial Unicode MS" pitchFamily="34" charset="-128"/>
                 <a:cs typeface="Arial Unicode MS" pitchFamily="34" charset="-128"/>
               </a:rPr>
-              <a:t>Invoice RAI</a:t>
+              <a:t>FARR_D_INVOICE</a:t>
             </a:r>
             <a:endParaRPr kumimoji="0" lang="en-US" sz="1400" b="0" i="0" u="none" strike="noStrike" kern="0" cap="none" spc="0" normalizeH="0" baseline="0" noProof="0" dirty="0" err="1" smtClean="0">
               <a:ln>
@@ -13408,7 +13391,7 @@
                 <a:ea typeface="Arial Unicode MS" pitchFamily="34" charset="-128"/>
                 <a:cs typeface="Arial Unicode MS" pitchFamily="34" charset="-128"/>
               </a:rPr>
-              <a:t>FARR_D_MAPPING</a:t>
+              <a:t>FARR_D_MAPPING_I</a:t>
             </a:r>
             <a:endParaRPr kumimoji="0" lang="en-US" sz="1000" b="0" i="0" u="none" strike="noStrike" kern="0" cap="none" spc="0" normalizeH="0" baseline="0" noProof="0" dirty="0" err="1" smtClean="0">
               <a:ln>
@@ -13833,7 +13816,7 @@
                 <a:ea typeface="Arial Unicode MS" pitchFamily="34" charset="-128"/>
                 <a:cs typeface="Arial Unicode MS" pitchFamily="34" charset="-128"/>
               </a:rPr>
-              <a:t>FARR_D_MAPPING</a:t>
+              <a:t>FARR_D_MAPPING_F</a:t>
             </a:r>
             <a:endParaRPr kumimoji="0" lang="en-US" sz="1000" b="0" i="0" u="none" strike="noStrike" kern="0" cap="none" spc="0" normalizeH="0" baseline="0" noProof="0" dirty="0" err="1" smtClean="0">
               <a:ln>
@@ -14038,6 +14021,150 @@
           <a:xfrm flipH="1">
             <a:off x="3034514" y="3987081"/>
             <a:ext cx="194208" cy="0"/>
+          </a:xfrm>
+          <a:prstGeom prst="straightConnector1">
+            <a:avLst/>
+          </a:prstGeom>
+          <a:ln w="6350">
+            <a:solidFill>
+              <a:schemeClr val="tx1"/>
+            </a:solidFill>
+            <a:tailEnd type="triangle"/>
+          </a:ln>
+        </p:spPr>
+        <p:style>
+          <a:lnRef idx="1">
+            <a:schemeClr val="accent1"/>
+          </a:lnRef>
+          <a:fillRef idx="0">
+            <a:schemeClr val="accent1"/>
+          </a:fillRef>
+          <a:effectRef idx="0">
+            <a:schemeClr val="accent1"/>
+          </a:effectRef>
+          <a:fontRef idx="minor">
+            <a:schemeClr val="tx1"/>
+          </a:fontRef>
+        </p:style>
+      </p:cxnSp>
+      <p:cxnSp>
+        <p:nvCxnSpPr>
+          <p:cNvPr id="39" name="Straight Arrow Connector 38"/>
+          <p:cNvCxnSpPr/>
+          <p:nvPr/>
+        </p:nvCxnSpPr>
+        <p:spPr>
+          <a:xfrm flipH="1">
+            <a:off x="5692975" y="2734289"/>
+            <a:ext cx="303223" cy="5800"/>
+          </a:xfrm>
+          <a:prstGeom prst="straightConnector1">
+            <a:avLst/>
+          </a:prstGeom>
+          <a:ln w="6350">
+            <a:solidFill>
+              <a:schemeClr val="tx1"/>
+            </a:solidFill>
+            <a:tailEnd type="triangle"/>
+          </a:ln>
+        </p:spPr>
+        <p:style>
+          <a:lnRef idx="1">
+            <a:schemeClr val="accent1"/>
+          </a:lnRef>
+          <a:fillRef idx="0">
+            <a:schemeClr val="accent1"/>
+          </a:fillRef>
+          <a:effectRef idx="0">
+            <a:schemeClr val="accent1"/>
+          </a:effectRef>
+          <a:fontRef idx="minor">
+            <a:schemeClr val="tx1"/>
+          </a:fontRef>
+        </p:style>
+      </p:cxnSp>
+      <p:cxnSp>
+        <p:nvCxnSpPr>
+          <p:cNvPr id="40" name="Straight Arrow Connector 39"/>
+          <p:cNvCxnSpPr/>
+          <p:nvPr/>
+        </p:nvCxnSpPr>
+        <p:spPr>
+          <a:xfrm flipH="1">
+            <a:off x="3508354" y="2787749"/>
+            <a:ext cx="501495" cy="5800"/>
+          </a:xfrm>
+          <a:prstGeom prst="straightConnector1">
+            <a:avLst/>
+          </a:prstGeom>
+          <a:ln w="6350">
+            <a:solidFill>
+              <a:schemeClr val="tx1"/>
+            </a:solidFill>
+            <a:tailEnd type="triangle"/>
+          </a:ln>
+        </p:spPr>
+        <p:style>
+          <a:lnRef idx="1">
+            <a:schemeClr val="accent1"/>
+          </a:lnRef>
+          <a:fillRef idx="0">
+            <a:schemeClr val="accent1"/>
+          </a:fillRef>
+          <a:effectRef idx="0">
+            <a:schemeClr val="accent1"/>
+          </a:effectRef>
+          <a:fontRef idx="minor">
+            <a:schemeClr val="tx1"/>
+          </a:fontRef>
+        </p:style>
+      </p:cxnSp>
+      <p:cxnSp>
+        <p:nvCxnSpPr>
+          <p:cNvPr id="41" name="Straight Arrow Connector 40"/>
+          <p:cNvCxnSpPr/>
+          <p:nvPr/>
+        </p:nvCxnSpPr>
+        <p:spPr>
+          <a:xfrm flipH="1">
+            <a:off x="5702194" y="1677021"/>
+            <a:ext cx="303223" cy="5800"/>
+          </a:xfrm>
+          <a:prstGeom prst="straightConnector1">
+            <a:avLst/>
+          </a:prstGeom>
+          <a:ln w="6350">
+            <a:solidFill>
+              <a:schemeClr val="tx1"/>
+            </a:solidFill>
+            <a:tailEnd type="triangle"/>
+          </a:ln>
+        </p:spPr>
+        <p:style>
+          <a:lnRef idx="1">
+            <a:schemeClr val="accent1"/>
+          </a:lnRef>
+          <a:fillRef idx="0">
+            <a:schemeClr val="accent1"/>
+          </a:fillRef>
+          <a:effectRef idx="0">
+            <a:schemeClr val="accent1"/>
+          </a:effectRef>
+          <a:fontRef idx="minor">
+            <a:schemeClr val="tx1"/>
+          </a:fontRef>
+        </p:style>
+      </p:cxnSp>
+      <p:cxnSp>
+        <p:nvCxnSpPr>
+          <p:cNvPr id="42" name="Straight Arrow Connector 41"/>
+          <p:cNvCxnSpPr/>
+          <p:nvPr/>
+        </p:nvCxnSpPr>
+        <p:spPr>
+          <a:xfrm flipH="1">
+            <a:off x="3783931" y="1671221"/>
+            <a:ext cx="303223" cy="5800"/>
           </a:xfrm>
           <a:prstGeom prst="straightConnector1">
             <a:avLst/>
@@ -16379,10 +16506,6 @@
               </a:rPr>
               <a:t>View from FI</a:t>
             </a:r>
-            <a:endParaRPr lang="en-US" sz="1800" kern="0" dirty="0" smtClean="0">
-              <a:ea typeface="Arial Unicode MS" pitchFamily="34" charset="-128"/>
-              <a:cs typeface="Arial Unicode MS" pitchFamily="34" charset="-128"/>
-            </a:endParaRPr>
           </a:p>
         </p:txBody>
       </p:sp>
@@ -16427,10 +16550,6 @@
               </a:rPr>
               <a:t>View from FI + PC </a:t>
             </a:r>
-            <a:endParaRPr lang="en-US" sz="1800" kern="0" dirty="0" smtClean="0">
-              <a:ea typeface="Arial Unicode MS" pitchFamily="34" charset="-128"/>
-              <a:cs typeface="Arial Unicode MS" pitchFamily="34" charset="-128"/>
-            </a:endParaRPr>
           </a:p>
         </p:txBody>
       </p:sp>
@@ -16475,10 +16594,6 @@
               </a:rPr>
               <a:t>Reporting per period </a:t>
             </a:r>
-            <a:endParaRPr lang="en-US" sz="1800" kern="0" dirty="0" smtClean="0">
-              <a:ea typeface="Arial Unicode MS" pitchFamily="34" charset="-128"/>
-              <a:cs typeface="Arial Unicode MS" pitchFamily="34" charset="-128"/>
-            </a:endParaRPr>
           </a:p>
         </p:txBody>
       </p:sp>
@@ -16523,10 +16638,6 @@
               </a:rPr>
               <a:t>Reporting per period </a:t>
             </a:r>
-            <a:endParaRPr lang="en-US" sz="1800" kern="0" dirty="0" smtClean="0">
-              <a:ea typeface="Arial Unicode MS" pitchFamily="34" charset="-128"/>
-              <a:cs typeface="Arial Unicode MS" pitchFamily="34" charset="-128"/>
-            </a:endParaRPr>
           </a:p>
         </p:txBody>
       </p:sp>
@@ -17310,21 +17421,7 @@
                 <a:ea typeface="Arial Unicode MS" pitchFamily="34" charset="-128"/>
                 <a:cs typeface="Arial Unicode MS" pitchFamily="34" charset="-128"/>
               </a:rPr>
-              <a:t>Cumulative catchup: </a:t>
-            </a:r>
-            <a:r>
-              <a:rPr lang="en-US" sz="2000" kern="0" dirty="0" smtClean="0">
-                <a:ea typeface="Arial Unicode MS" pitchFamily="34" charset="-128"/>
-                <a:cs typeface="Arial Unicode MS" pitchFamily="34" charset="-128"/>
-              </a:rPr>
-              <a:t>Get to know cont</a:t>
-            </a:r>
-            <a:r>
-              <a:rPr lang="en-US" sz="2000" kern="0" dirty="0" smtClean="0">
-                <a:ea typeface="Arial Unicode MS" pitchFamily="34" charset="-128"/>
-                <a:cs typeface="Arial Unicode MS" pitchFamily="34" charset="-128"/>
-              </a:rPr>
-              <a:t>ribution of past the period when change happens within the fiscal year for Management Reporting.</a:t>
+              <a:t>Cumulative catchup: Get to know contribution of past the period when change happens within the fiscal year for Management Reporting.</a:t>
             </a:r>
           </a:p>
           <a:p>
@@ -17431,13 +17528,6 @@
                 <a:cs typeface="Arial Unicode MS" pitchFamily="34" charset="-128"/>
               </a:rPr>
               <a:t>Intercompany process: no additional requirement</a:t>
-            </a:r>
-            <a:r>
-              <a:rPr lang="en-US" sz="2000" kern="0" dirty="0" smtClean="0">
-                <a:ea typeface="Arial Unicode MS" pitchFamily="34" charset="-128"/>
-                <a:cs typeface="Arial Unicode MS" pitchFamily="34" charset="-128"/>
-              </a:rPr>
-              <a:t/>
             </a:r>
             <a:br>
               <a:rPr lang="en-US" sz="2000" kern="0" dirty="0" smtClean="0">

</xml_diff>